<commit_message>
add postprocessing for icce
</commit_message>
<xml_diff>
--- a/WIKI/images/draw.pptx
+++ b/WIKI/images/draw.pptx
@@ -6,6 +6,7 @@
   </p:sldMasterIdLst>
   <p:sldIdLst>
     <p:sldId id="256" r:id="rId2"/>
+    <p:sldId id="257" r:id="rId3"/>
   </p:sldIdLst>
   <p:sldSz cx="12192000" cy="6858000"/>
   <p:notesSz cx="6858000" cy="9144000"/>
@@ -104,6 +105,11 @@
       </a:defRPr>
     </a:lvl9pPr>
   </p:defaultTextStyle>
+  <p:extLst>
+    <p:ext uri="{EFAFB233-063F-42B5-8137-9DF3F51BA10A}">
+      <p15:sldGuideLst xmlns:p15="http://schemas.microsoft.com/office/powerpoint/2012/main"/>
+    </p:ext>
+  </p:extLst>
 </p:presentation>
 </file>
 
@@ -254,7 +260,7 @@
           <a:p>
             <a:fld id="{8970A1C0-47BB-7C49-8AAA-0D2761F2C593}" type="datetimeFigureOut">
               <a:rPr lang="en-US" smtClean="0"/>
-              <a:t>4/20/22</a:t>
+              <a:t>4/25/22</a:t>
             </a:fld>
             <a:endParaRPr lang="en-US"/>
           </a:p>
@@ -452,7 +458,7 @@
           <a:p>
             <a:fld id="{8970A1C0-47BB-7C49-8AAA-0D2761F2C593}" type="datetimeFigureOut">
               <a:rPr lang="en-US" smtClean="0"/>
-              <a:t>4/20/22</a:t>
+              <a:t>4/25/22</a:t>
             </a:fld>
             <a:endParaRPr lang="en-US"/>
           </a:p>
@@ -660,7 +666,7 @@
           <a:p>
             <a:fld id="{8970A1C0-47BB-7C49-8AAA-0D2761F2C593}" type="datetimeFigureOut">
               <a:rPr lang="en-US" smtClean="0"/>
-              <a:t>4/20/22</a:t>
+              <a:t>4/25/22</a:t>
             </a:fld>
             <a:endParaRPr lang="en-US"/>
           </a:p>
@@ -858,7 +864,7 @@
           <a:p>
             <a:fld id="{8970A1C0-47BB-7C49-8AAA-0D2761F2C593}" type="datetimeFigureOut">
               <a:rPr lang="en-US" smtClean="0"/>
-              <a:t>4/20/22</a:t>
+              <a:t>4/25/22</a:t>
             </a:fld>
             <a:endParaRPr lang="en-US"/>
           </a:p>
@@ -1133,7 +1139,7 @@
           <a:p>
             <a:fld id="{8970A1C0-47BB-7C49-8AAA-0D2761F2C593}" type="datetimeFigureOut">
               <a:rPr lang="en-US" smtClean="0"/>
-              <a:t>4/20/22</a:t>
+              <a:t>4/25/22</a:t>
             </a:fld>
             <a:endParaRPr lang="en-US"/>
           </a:p>
@@ -1398,7 +1404,7 @@
           <a:p>
             <a:fld id="{8970A1C0-47BB-7C49-8AAA-0D2761F2C593}" type="datetimeFigureOut">
               <a:rPr lang="en-US" smtClean="0"/>
-              <a:t>4/20/22</a:t>
+              <a:t>4/25/22</a:t>
             </a:fld>
             <a:endParaRPr lang="en-US"/>
           </a:p>
@@ -1810,7 +1816,7 @@
           <a:p>
             <a:fld id="{8970A1C0-47BB-7C49-8AAA-0D2761F2C593}" type="datetimeFigureOut">
               <a:rPr lang="en-US" smtClean="0"/>
-              <a:t>4/20/22</a:t>
+              <a:t>4/25/22</a:t>
             </a:fld>
             <a:endParaRPr lang="en-US"/>
           </a:p>
@@ -1951,7 +1957,7 @@
           <a:p>
             <a:fld id="{8970A1C0-47BB-7C49-8AAA-0D2761F2C593}" type="datetimeFigureOut">
               <a:rPr lang="en-US" smtClean="0"/>
-              <a:t>4/20/22</a:t>
+              <a:t>4/25/22</a:t>
             </a:fld>
             <a:endParaRPr lang="en-US"/>
           </a:p>
@@ -2064,7 +2070,7 @@
           <a:p>
             <a:fld id="{8970A1C0-47BB-7C49-8AAA-0D2761F2C593}" type="datetimeFigureOut">
               <a:rPr lang="en-US" smtClean="0"/>
-              <a:t>4/20/22</a:t>
+              <a:t>4/25/22</a:t>
             </a:fld>
             <a:endParaRPr lang="en-US"/>
           </a:p>
@@ -2375,7 +2381,7 @@
           <a:p>
             <a:fld id="{8970A1C0-47BB-7C49-8AAA-0D2761F2C593}" type="datetimeFigureOut">
               <a:rPr lang="en-US" smtClean="0"/>
-              <a:t>4/20/22</a:t>
+              <a:t>4/25/22</a:t>
             </a:fld>
             <a:endParaRPr lang="en-US"/>
           </a:p>
@@ -2663,7 +2669,7 @@
           <a:p>
             <a:fld id="{8970A1C0-47BB-7C49-8AAA-0D2761F2C593}" type="datetimeFigureOut">
               <a:rPr lang="en-US" smtClean="0"/>
-              <a:t>4/20/22</a:t>
+              <a:t>4/25/22</a:t>
             </a:fld>
             <a:endParaRPr lang="en-US"/>
           </a:p>
@@ -2904,7 +2910,7 @@
           <a:p>
             <a:fld id="{8970A1C0-47BB-7C49-8AAA-0D2761F2C593}" type="datetimeFigureOut">
               <a:rPr lang="en-US" smtClean="0"/>
-              <a:t>4/20/22</a:t>
+              <a:t>4/25/22</a:t>
             </a:fld>
             <a:endParaRPr lang="en-US"/>
           </a:p>
@@ -4000,6 +4006,228 @@
 </p:sld>
 </file>
 
+<file path=ppt/slides/slide2.xml><?xml version="1.0" encoding="utf-8"?>
+<p:sld xmlns:a="http://schemas.openxmlformats.org/drawingml/2006/main" xmlns:r="http://schemas.openxmlformats.org/officeDocument/2006/relationships" xmlns:p="http://schemas.openxmlformats.org/presentationml/2006/main">
+  <p:cSld>
+    <p:spTree>
+      <p:nvGrpSpPr>
+        <p:cNvPr id="1" name=""/>
+        <p:cNvGrpSpPr/>
+        <p:nvPr/>
+      </p:nvGrpSpPr>
+      <p:grpSpPr>
+        <a:xfrm>
+          <a:off x="0" y="0"/>
+          <a:ext cx="0" cy="0"/>
+          <a:chOff x="0" y="0"/>
+          <a:chExt cx="0" cy="0"/>
+        </a:xfrm>
+      </p:grpSpPr>
+      <p:pic>
+        <p:nvPicPr>
+          <p:cNvPr id="11" name="Picture 10" descr="A picture containing map&#10;&#10;Description automatically generated">
+            <a:extLst>
+              <a:ext uri="{FF2B5EF4-FFF2-40B4-BE49-F238E27FC236}">
+                <a16:creationId xmlns:a16="http://schemas.microsoft.com/office/drawing/2014/main" id="{5FF79A94-6B8D-C941-B343-76016633978B}"/>
+              </a:ext>
+            </a:extLst>
+          </p:cNvPr>
+          <p:cNvPicPr>
+            <a:picLocks noChangeAspect="1"/>
+          </p:cNvPicPr>
+          <p:nvPr/>
+        </p:nvPicPr>
+        <p:blipFill>
+          <a:blip r:embed="rId2"/>
+          <a:stretch>
+            <a:fillRect/>
+          </a:stretch>
+        </p:blipFill>
+        <p:spPr>
+          <a:xfrm>
+            <a:off x="2387600" y="1181100"/>
+            <a:ext cx="7416800" cy="4495800"/>
+          </a:xfrm>
+          <a:prstGeom prst="rect">
+            <a:avLst/>
+          </a:prstGeom>
+        </p:spPr>
+      </p:pic>
+      <p:pic>
+        <p:nvPicPr>
+          <p:cNvPr id="13" name="Picture 12" descr="Chart, surface chart&#10;&#10;Description automatically generated">
+            <a:extLst>
+              <a:ext uri="{FF2B5EF4-FFF2-40B4-BE49-F238E27FC236}">
+                <a16:creationId xmlns:a16="http://schemas.microsoft.com/office/drawing/2014/main" id="{379A2BAC-5EAE-F14E-B796-3081FF6EC1B9}"/>
+              </a:ext>
+            </a:extLst>
+          </p:cNvPr>
+          <p:cNvPicPr>
+            <a:picLocks noChangeAspect="1"/>
+          </p:cNvPicPr>
+          <p:nvPr/>
+        </p:nvPicPr>
+        <p:blipFill>
+          <a:blip r:embed="rId3">
+            <a:extLst>
+              <a:ext uri="{BEBA8EAE-BF5A-486C-A8C5-ECC9F3942E4B}">
+                <a14:imgProps xmlns:a14="http://schemas.microsoft.com/office/drawing/2010/main">
+                  <a14:imgLayer r:embed="rId4">
+                    <a14:imgEffect>
+                      <a14:brightnessContrast bright="-20000" contrast="20000"/>
+                    </a14:imgEffect>
+                  </a14:imgLayer>
+                </a14:imgProps>
+              </a:ext>
+            </a:extLst>
+          </a:blip>
+          <a:stretch>
+            <a:fillRect/>
+          </a:stretch>
+        </p:blipFill>
+        <p:spPr>
+          <a:xfrm>
+            <a:off x="1897561" y="3920671"/>
+            <a:ext cx="3710948" cy="1892300"/>
+          </a:xfrm>
+          <a:prstGeom prst="rect">
+            <a:avLst/>
+          </a:prstGeom>
+        </p:spPr>
+      </p:pic>
+      <p:cxnSp>
+        <p:nvCxnSpPr>
+          <p:cNvPr id="15" name="Straight Arrow Connector 14">
+            <a:extLst>
+              <a:ext uri="{FF2B5EF4-FFF2-40B4-BE49-F238E27FC236}">
+                <a16:creationId xmlns:a16="http://schemas.microsoft.com/office/drawing/2014/main" id="{E7994D9D-1327-8C4E-9D4F-093483E54B3F}"/>
+              </a:ext>
+            </a:extLst>
+          </p:cNvPr>
+          <p:cNvCxnSpPr/>
+          <p:nvPr/>
+        </p:nvCxnSpPr>
+        <p:spPr>
+          <a:xfrm>
+            <a:off x="3082834" y="2246811"/>
+            <a:ext cx="670201" cy="0"/>
+          </a:xfrm>
+          <a:prstGeom prst="straightConnector1">
+            <a:avLst/>
+          </a:prstGeom>
+          <a:ln w="57150">
+            <a:headEnd type="none" w="med" len="med"/>
+            <a:tailEnd type="triangle" w="med" len="med"/>
+          </a:ln>
+        </p:spPr>
+        <p:style>
+          <a:lnRef idx="1">
+            <a:schemeClr val="accent1"/>
+          </a:lnRef>
+          <a:fillRef idx="0">
+            <a:schemeClr val="accent1"/>
+          </a:fillRef>
+          <a:effectRef idx="0">
+            <a:schemeClr val="accent1"/>
+          </a:effectRef>
+          <a:fontRef idx="minor">
+            <a:schemeClr val="tx1"/>
+          </a:fontRef>
+        </p:style>
+      </p:cxnSp>
+      <p:cxnSp>
+        <p:nvCxnSpPr>
+          <p:cNvPr id="16" name="Straight Arrow Connector 15">
+            <a:extLst>
+              <a:ext uri="{FF2B5EF4-FFF2-40B4-BE49-F238E27FC236}">
+                <a16:creationId xmlns:a16="http://schemas.microsoft.com/office/drawing/2014/main" id="{99FD45EA-7CBB-714D-9C8D-EE51A87F1F54}"/>
+              </a:ext>
+            </a:extLst>
+          </p:cNvPr>
+          <p:cNvCxnSpPr/>
+          <p:nvPr/>
+        </p:nvCxnSpPr>
+        <p:spPr>
+          <a:xfrm>
+            <a:off x="3082833" y="2869474"/>
+            <a:ext cx="670201" cy="0"/>
+          </a:xfrm>
+          <a:prstGeom prst="straightConnector1">
+            <a:avLst/>
+          </a:prstGeom>
+          <a:ln w="57150">
+            <a:headEnd type="none" w="med" len="med"/>
+            <a:tailEnd type="triangle" w="med" len="med"/>
+          </a:ln>
+        </p:spPr>
+        <p:style>
+          <a:lnRef idx="1">
+            <a:schemeClr val="accent1"/>
+          </a:lnRef>
+          <a:fillRef idx="0">
+            <a:schemeClr val="accent1"/>
+          </a:fillRef>
+          <a:effectRef idx="0">
+            <a:schemeClr val="accent1"/>
+          </a:effectRef>
+          <a:fontRef idx="minor">
+            <a:schemeClr val="tx1"/>
+          </a:fontRef>
+        </p:style>
+      </p:cxnSp>
+      <p:cxnSp>
+        <p:nvCxnSpPr>
+          <p:cNvPr id="17" name="Straight Arrow Connector 16">
+            <a:extLst>
+              <a:ext uri="{FF2B5EF4-FFF2-40B4-BE49-F238E27FC236}">
+                <a16:creationId xmlns:a16="http://schemas.microsoft.com/office/drawing/2014/main" id="{ECF0EDC2-2B06-FD41-A546-B04AB255DC1C}"/>
+              </a:ext>
+            </a:extLst>
+          </p:cNvPr>
+          <p:cNvCxnSpPr/>
+          <p:nvPr/>
+        </p:nvCxnSpPr>
+        <p:spPr>
+          <a:xfrm>
+            <a:off x="3082832" y="3437708"/>
+            <a:ext cx="670201" cy="0"/>
+          </a:xfrm>
+          <a:prstGeom prst="straightConnector1">
+            <a:avLst/>
+          </a:prstGeom>
+          <a:ln w="57150">
+            <a:headEnd type="none" w="med" len="med"/>
+            <a:tailEnd type="triangle" w="med" len="med"/>
+          </a:ln>
+        </p:spPr>
+        <p:style>
+          <a:lnRef idx="1">
+            <a:schemeClr val="accent1"/>
+          </a:lnRef>
+          <a:fillRef idx="0">
+            <a:schemeClr val="accent1"/>
+          </a:fillRef>
+          <a:effectRef idx="0">
+            <a:schemeClr val="accent1"/>
+          </a:effectRef>
+          <a:fontRef idx="minor">
+            <a:schemeClr val="tx1"/>
+          </a:fontRef>
+        </p:style>
+      </p:cxnSp>
+    </p:spTree>
+    <p:extLst>
+      <p:ext uri="{BB962C8B-B14F-4D97-AF65-F5344CB8AC3E}">
+        <p14:creationId xmlns:p14="http://schemas.microsoft.com/office/powerpoint/2010/main" val="2109688842"/>
+      </p:ext>
+    </p:extLst>
+  </p:cSld>
+  <p:clrMapOvr>
+    <a:masterClrMapping/>
+  </p:clrMapOvr>
+</p:sld>
+</file>
+
 <file path=ppt/theme/theme1.xml><?xml version="1.0" encoding="utf-8"?>
 <a:theme xmlns:a="http://schemas.openxmlformats.org/drawingml/2006/main" name="Office Theme">
   <a:themeElements>

</xml_diff>